<commit_message>
Added concealing tools information to report
</commit_message>
<xml_diff>
--- a/presentations/Detekcia nepovoleneho prístupu kustomizáciou nízko interaktívnych honeypotov1.pptx
+++ b/presentations/Detekcia nepovoleneho prístupu kustomizáciou nízko interaktívnych honeypotov1.pptx
@@ -121,6 +121,11 @@
       </a:defRPr>
     </a:lvl9pPr>
   </p:defaultTextStyle>
+  <p:extLst>
+    <p:ext uri="{EFAFB233-063F-42B5-8137-9DF3F51BA10A}">
+      <p15:sldGuideLst xmlns:p15="http://schemas.microsoft.com/office/powerpoint/2012/main"/>
+    </p:ext>
+  </p:extLst>
 </p:presentation>
 </file>
 
@@ -19028,7 +19033,7 @@
           <a:p>
             <a:fld id="{D150AA39-B59D-403E-8167-B52EA36C0242}" type="datetimeFigureOut">
               <a:rPr lang="sk-SK" smtClean="0"/>
-              <a:t>18. 3. 2022</a:t>
+              <a:t>19. 3. 2022</a:t>
             </a:fld>
             <a:endParaRPr lang="sk-SK"/>
           </a:p>
@@ -19279,7 +19284,7 @@
           <a:p>
             <a:fld id="{D150AA39-B59D-403E-8167-B52EA36C0242}" type="datetimeFigureOut">
               <a:rPr lang="sk-SK" smtClean="0"/>
-              <a:t>18. 3. 2022</a:t>
+              <a:t>19. 3. 2022</a:t>
             </a:fld>
             <a:endParaRPr lang="sk-SK"/>
           </a:p>
@@ -19593,7 +19598,7 @@
           <a:p>
             <a:fld id="{D150AA39-B59D-403E-8167-B52EA36C0242}" type="datetimeFigureOut">
               <a:rPr lang="sk-SK" smtClean="0"/>
-              <a:t>18. 3. 2022</a:t>
+              <a:t>19. 3. 2022</a:t>
             </a:fld>
             <a:endParaRPr lang="sk-SK"/>
           </a:p>
@@ -19934,7 +19939,7 @@
           <a:p>
             <a:fld id="{D150AA39-B59D-403E-8167-B52EA36C0242}" type="datetimeFigureOut">
               <a:rPr lang="sk-SK" smtClean="0"/>
-              <a:t>18. 3. 2022</a:t>
+              <a:t>19. 3. 2022</a:t>
             </a:fld>
             <a:endParaRPr lang="sk-SK"/>
           </a:p>
@@ -20248,7 +20253,7 @@
           <a:p>
             <a:fld id="{D150AA39-B59D-403E-8167-B52EA36C0242}" type="datetimeFigureOut">
               <a:rPr lang="sk-SK" smtClean="0"/>
-              <a:t>18. 3. 2022</a:t>
+              <a:t>19. 3. 2022</a:t>
             </a:fld>
             <a:endParaRPr lang="sk-SK"/>
           </a:p>
@@ -20641,7 +20646,7 @@
           <a:p>
             <a:fld id="{D150AA39-B59D-403E-8167-B52EA36C0242}" type="datetimeFigureOut">
               <a:rPr lang="sk-SK" smtClean="0"/>
-              <a:t>18. 3. 2022</a:t>
+              <a:t>19. 3. 2022</a:t>
             </a:fld>
             <a:endParaRPr lang="sk-SK"/>
           </a:p>
@@ -20811,7 +20816,7 @@
           <a:p>
             <a:fld id="{D150AA39-B59D-403E-8167-B52EA36C0242}" type="datetimeFigureOut">
               <a:rPr lang="sk-SK" smtClean="0"/>
-              <a:t>18. 3. 2022</a:t>
+              <a:t>19. 3. 2022</a:t>
             </a:fld>
             <a:endParaRPr lang="sk-SK"/>
           </a:p>
@@ -20991,7 +20996,7 @@
           <a:p>
             <a:fld id="{D150AA39-B59D-403E-8167-B52EA36C0242}" type="datetimeFigureOut">
               <a:rPr lang="sk-SK" smtClean="0"/>
-              <a:t>18. 3. 2022</a:t>
+              <a:t>19. 3. 2022</a:t>
             </a:fld>
             <a:endParaRPr lang="sk-SK"/>
           </a:p>
@@ -21167,7 +21172,7 @@
           <a:p>
             <a:fld id="{D150AA39-B59D-403E-8167-B52EA36C0242}" type="datetimeFigureOut">
               <a:rPr lang="sk-SK" smtClean="0"/>
-              <a:t>18. 3. 2022</a:t>
+              <a:t>19. 3. 2022</a:t>
             </a:fld>
             <a:endParaRPr lang="sk-SK"/>
           </a:p>
@@ -21414,7 +21419,7 @@
           <a:p>
             <a:fld id="{D150AA39-B59D-403E-8167-B52EA36C0242}" type="datetimeFigureOut">
               <a:rPr lang="sk-SK" smtClean="0"/>
-              <a:t>18. 3. 2022</a:t>
+              <a:t>19. 3. 2022</a:t>
             </a:fld>
             <a:endParaRPr lang="sk-SK"/>
           </a:p>
@@ -21646,7 +21651,7 @@
           <a:p>
             <a:fld id="{D150AA39-B59D-403E-8167-B52EA36C0242}" type="datetimeFigureOut">
               <a:rPr lang="sk-SK" smtClean="0"/>
-              <a:t>18. 3. 2022</a:t>
+              <a:t>19. 3. 2022</a:t>
             </a:fld>
             <a:endParaRPr lang="sk-SK"/>
           </a:p>
@@ -22020,7 +22025,7 @@
           <a:p>
             <a:fld id="{D150AA39-B59D-403E-8167-B52EA36C0242}" type="datetimeFigureOut">
               <a:rPr lang="sk-SK" smtClean="0"/>
-              <a:t>18. 3. 2022</a:t>
+              <a:t>19. 3. 2022</a:t>
             </a:fld>
             <a:endParaRPr lang="sk-SK"/>
           </a:p>
@@ -22143,7 +22148,7 @@
           <a:p>
             <a:fld id="{D150AA39-B59D-403E-8167-B52EA36C0242}" type="datetimeFigureOut">
               <a:rPr lang="sk-SK" smtClean="0"/>
-              <a:t>18. 3. 2022</a:t>
+              <a:t>19. 3. 2022</a:t>
             </a:fld>
             <a:endParaRPr lang="sk-SK"/>
           </a:p>
@@ -22238,7 +22243,7 @@
           <a:p>
             <a:fld id="{D150AA39-B59D-403E-8167-B52EA36C0242}" type="datetimeFigureOut">
               <a:rPr lang="sk-SK" smtClean="0"/>
-              <a:t>18. 3. 2022</a:t>
+              <a:t>19. 3. 2022</a:t>
             </a:fld>
             <a:endParaRPr lang="sk-SK"/>
           </a:p>
@@ -22493,7 +22498,7 @@
           <a:p>
             <a:fld id="{D150AA39-B59D-403E-8167-B52EA36C0242}" type="datetimeFigureOut">
               <a:rPr lang="sk-SK" smtClean="0"/>
-              <a:t>18. 3. 2022</a:t>
+              <a:t>19. 3. 2022</a:t>
             </a:fld>
             <a:endParaRPr lang="sk-SK"/>
           </a:p>
@@ -22756,7 +22761,7 @@
           <a:p>
             <a:fld id="{D150AA39-B59D-403E-8167-B52EA36C0242}" type="datetimeFigureOut">
               <a:rPr lang="sk-SK" smtClean="0"/>
-              <a:t>18. 3. 2022</a:t>
+              <a:t>19. 3. 2022</a:t>
             </a:fld>
             <a:endParaRPr lang="sk-SK"/>
           </a:p>
@@ -23499,7 +23504,7 @@
           <a:p>
             <a:fld id="{D150AA39-B59D-403E-8167-B52EA36C0242}" type="datetimeFigureOut">
               <a:rPr lang="sk-SK" smtClean="0"/>
-              <a:t>18. 3. 2022</a:t>
+              <a:t>19. 3. 2022</a:t>
             </a:fld>
             <a:endParaRPr lang="sk-SK"/>
           </a:p>
@@ -26494,11 +26499,11 @@
             </a:r>
             <a:r>
               <a:rPr lang="sk-SK" dirty="0" err="1"/>
-              <a:t>iframu</a:t>
+              <a:t>iframe</a:t>
             </a:r>
             <a:r>
               <a:rPr lang="sk-SK" dirty="0"/>
-              <a:t> do </a:t>
+              <a:t> elementu do </a:t>
             </a:r>
             <a:r>
               <a:rPr lang="sk-SK" dirty="0" err="1"/>
@@ -27280,12 +27285,8 @@
               <a:buAutoNum type="arabicPeriod"/>
             </a:pPr>
             <a:r>
-              <a:rPr lang="sk-SK" dirty="0" err="1"/>
-              <a:t>Zahešovanie</a:t>
-            </a:r>
-            <a:r>
               <a:rPr lang="sk-SK" dirty="0"/>
-              <a:t> obsahu metódami pre skrytie obsahu</a:t>
+              <a:t>Zamaskovanie obsahu metódami pre skrytie obsahu</a:t>
             </a:r>
           </a:p>
           <a:p>

</xml_diff>